<commit_message>
Update DependencyCommand diagram from 1.4-mid comments
</commit_message>
<xml_diff>
--- a/docs/diagrams/DependencyCommandSequenceDiagram.pptx
+++ b/docs/diagrams/DependencyCommandSequenceDiagram.pptx
@@ -208,7 +208,7 @@
           <a:p>
             <a:fld id="{F5CC4B3F-88C1-4FFA-B1B6-F41C21DC6924}" type="datetimeFigureOut">
               <a:rPr lang="en-US" smtClean="0"/>
-              <a:t>10/25/18</a:t>
+              <a:t>11/10/18</a:t>
             </a:fld>
             <a:endParaRPr lang="en-US"/>
           </a:p>
@@ -738,7 +738,7 @@
           <a:p>
             <a:fld id="{78C97017-6FC3-485B-9764-EAC9E56C1D49}" type="datetimeFigureOut">
               <a:rPr lang="en-US" smtClean="0"/>
-              <a:t>10/25/18</a:t>
+              <a:t>11/10/18</a:t>
             </a:fld>
             <a:endParaRPr lang="en-US"/>
           </a:p>
@@ -906,7 +906,7 @@
           <a:p>
             <a:fld id="{78C97017-6FC3-485B-9764-EAC9E56C1D49}" type="datetimeFigureOut">
               <a:rPr lang="en-US" smtClean="0"/>
-              <a:t>10/25/18</a:t>
+              <a:t>11/10/18</a:t>
             </a:fld>
             <a:endParaRPr lang="en-US"/>
           </a:p>
@@ -1084,7 +1084,7 @@
           <a:p>
             <a:fld id="{78C97017-6FC3-485B-9764-EAC9E56C1D49}" type="datetimeFigureOut">
               <a:rPr lang="en-US" smtClean="0"/>
-              <a:t>10/25/18</a:t>
+              <a:t>11/10/18</a:t>
             </a:fld>
             <a:endParaRPr lang="en-US"/>
           </a:p>
@@ -1252,7 +1252,7 @@
           <a:p>
             <a:fld id="{78C97017-6FC3-485B-9764-EAC9E56C1D49}" type="datetimeFigureOut">
               <a:rPr lang="en-US" smtClean="0"/>
-              <a:t>10/25/18</a:t>
+              <a:t>11/10/18</a:t>
             </a:fld>
             <a:endParaRPr lang="en-US"/>
           </a:p>
@@ -1497,7 +1497,7 @@
           <a:p>
             <a:fld id="{78C97017-6FC3-485B-9764-EAC9E56C1D49}" type="datetimeFigureOut">
               <a:rPr lang="en-US" smtClean="0"/>
-              <a:t>10/25/18</a:t>
+              <a:t>11/10/18</a:t>
             </a:fld>
             <a:endParaRPr lang="en-US"/>
           </a:p>
@@ -1782,7 +1782,7 @@
           <a:p>
             <a:fld id="{78C97017-6FC3-485B-9764-EAC9E56C1D49}" type="datetimeFigureOut">
               <a:rPr lang="en-US" smtClean="0"/>
-              <a:t>10/25/18</a:t>
+              <a:t>11/10/18</a:t>
             </a:fld>
             <a:endParaRPr lang="en-US"/>
           </a:p>
@@ -2201,7 +2201,7 @@
           <a:p>
             <a:fld id="{78C97017-6FC3-485B-9764-EAC9E56C1D49}" type="datetimeFigureOut">
               <a:rPr lang="en-US" smtClean="0"/>
-              <a:t>10/25/18</a:t>
+              <a:t>11/10/18</a:t>
             </a:fld>
             <a:endParaRPr lang="en-US"/>
           </a:p>
@@ -2318,7 +2318,7 @@
           <a:p>
             <a:fld id="{78C97017-6FC3-485B-9764-EAC9E56C1D49}" type="datetimeFigureOut">
               <a:rPr lang="en-US" smtClean="0"/>
-              <a:t>10/25/18</a:t>
+              <a:t>11/10/18</a:t>
             </a:fld>
             <a:endParaRPr lang="en-US"/>
           </a:p>
@@ -2413,7 +2413,7 @@
           <a:p>
             <a:fld id="{78C97017-6FC3-485B-9764-EAC9E56C1D49}" type="datetimeFigureOut">
               <a:rPr lang="en-US" smtClean="0"/>
-              <a:t>10/25/18</a:t>
+              <a:t>11/10/18</a:t>
             </a:fld>
             <a:endParaRPr lang="en-US"/>
           </a:p>
@@ -2688,7 +2688,7 @@
           <a:p>
             <a:fld id="{78C97017-6FC3-485B-9764-EAC9E56C1D49}" type="datetimeFigureOut">
               <a:rPr lang="en-US" smtClean="0"/>
-              <a:t>10/25/18</a:t>
+              <a:t>11/10/18</a:t>
             </a:fld>
             <a:endParaRPr lang="en-US"/>
           </a:p>
@@ -2940,7 +2940,7 @@
           <a:p>
             <a:fld id="{78C97017-6FC3-485B-9764-EAC9E56C1D49}" type="datetimeFigureOut">
               <a:rPr lang="en-US" smtClean="0"/>
-              <a:t>10/25/18</a:t>
+              <a:t>11/10/18</a:t>
             </a:fld>
             <a:endParaRPr lang="en-US"/>
           </a:p>
@@ -3151,7 +3151,7 @@
           <a:p>
             <a:fld id="{78C97017-6FC3-485B-9764-EAC9E56C1D49}" type="datetimeFigureOut">
               <a:rPr lang="en-US" smtClean="0"/>
-              <a:t>10/25/18</a:t>
+              <a:t>11/10/18</a:t>
             </a:fld>
             <a:endParaRPr lang="en-US"/>
           </a:p>
@@ -4090,8 +4090,8 @@
         </p:nvSpPr>
         <p:spPr>
           <a:xfrm>
-            <a:off x="38100" y="990600"/>
-            <a:ext cx="1424846" cy="369332"/>
+            <a:off x="38099" y="990600"/>
+            <a:ext cx="1465469" cy="184666"/>
           </a:xfrm>
           <a:prstGeom prst="rect">
             <a:avLst/>
@@ -4119,13 +4119,16 @@
       <p:cxnSp>
         <p:nvCxnSpPr>
           <p:cNvPr id="28" name="Straight Arrow Connector 27"/>
-          <p:cNvCxnSpPr/>
+          <p:cNvCxnSpPr>
+            <a:cxnSpLocks/>
+            <a:endCxn id="19" idx="1"/>
+          </p:cNvCxnSpPr>
           <p:nvPr/>
         </p:nvCxnSpPr>
         <p:spPr>
-          <a:xfrm flipV="1">
-            <a:off x="3821637" y="1516695"/>
-            <a:ext cx="922392" cy="1"/>
+          <a:xfrm>
+            <a:off x="3767091" y="1495392"/>
+            <a:ext cx="795374" cy="0"/>
           </a:xfrm>
           <a:prstGeom prst="straightConnector1">
             <a:avLst/>
@@ -4996,7 +4999,7 @@
         </p:nvCxnSpPr>
         <p:spPr>
           <a:xfrm flipV="1">
-            <a:off x="1708245" y="1352407"/>
+            <a:off x="1645436" y="1371971"/>
             <a:ext cx="2028007" cy="11511"/>
           </a:xfrm>
           <a:prstGeom prst="straightConnector1">
@@ -5041,7 +5044,7 @@
         <p:spPr>
           <a:xfrm>
             <a:off x="1691998" y="4036462"/>
-            <a:ext cx="3831517" cy="0"/>
+            <a:ext cx="3519549" cy="0"/>
           </a:xfrm>
           <a:prstGeom prst="straightConnector1">
             <a:avLst/>
@@ -5335,7 +5338,7 @@
           </a:solidFill>
           <a:ln>
             <a:solidFill>
-              <a:srgbClr val="0070C0"/>
+              <a:schemeClr val="bg1"/>
             </a:solidFill>
           </a:ln>
           <a:effectLst/>
@@ -5359,7 +5362,7 @@
           <a:lstStyle/>
           <a:p>
             <a:pPr algn="ctr"/>
-            <a:endParaRPr lang="en-SG" sz="1400"/>
+            <a:endParaRPr lang="en-SG" sz="1400" dirty="0"/>
           </a:p>
         </p:txBody>
       </p:sp>
@@ -5419,7 +5422,7 @@
         </p:nvSpPr>
         <p:spPr>
           <a:xfrm>
-            <a:off x="4921301" y="2431662"/>
+            <a:off x="4598511" y="2363670"/>
             <a:ext cx="2549913" cy="184666"/>
           </a:xfrm>
           <a:prstGeom prst="rect">

</xml_diff>